<commit_message>
revisi tipe video dan tata cara
</commit_message>
<xml_diff>
--- a/SPESIFIKASI LOAD BALANCING.pptx
+++ b/SPESIFIKASI LOAD BALANCING.pptx
@@ -5,12 +5,13 @@
     <p:sldMasterId id="2147483648" r:id="rId1"/>
   </p:sldMasterIdLst>
   <p:sldIdLst>
-    <p:sldId id="256" r:id="rId3"/>
-    <p:sldId id="257" r:id="rId4"/>
-    <p:sldId id="258" r:id="rId5"/>
-    <p:sldId id="259" r:id="rId6"/>
-    <p:sldId id="260" r:id="rId7"/>
-    <p:sldId id="261" r:id="rId8"/>
+    <p:sldId id="256" r:id="rId2"/>
+    <p:sldId id="257" r:id="rId3"/>
+    <p:sldId id="258" r:id="rId4"/>
+    <p:sldId id="259" r:id="rId5"/>
+    <p:sldId id="260" r:id="rId6"/>
+    <p:sldId id="261" r:id="rId7"/>
+    <p:sldId id="263" r:id="rId8"/>
     <p:sldId id="262" r:id="rId9"/>
   </p:sldIdLst>
   <p:sldSz cx="12192000" cy="6858000"/>
@@ -110,6 +111,11 @@
       </a:defRPr>
     </a:lvl9pPr>
   </p:defaultTextStyle>
+  <p:extLst>
+    <p:ext uri="{EFAFB233-063F-42B5-8137-9DF3F51BA10A}">
+      <p15:sldGuideLst xmlns:p15="http://schemas.microsoft.com/office/powerpoint/2012/main"/>
+    </p:ext>
+  </p:extLst>
 </p:presentation>
 </file>
 
@@ -246,6 +252,7 @@
           <a:p>
             <a:fld id="{BBE3DD70-27A9-46A8-BFA0-C575602C9FDE}" type="datetimeFigureOut">
               <a:rPr lang="id-ID" smtClean="0"/>
+              <a:t>23/12/2016</a:t>
             </a:fld>
             <a:endParaRPr lang="id-ID"/>
           </a:p>
@@ -287,6 +294,7 @@
           <a:p>
             <a:fld id="{92548EFC-61A5-4AFF-A0C2-AFE4C01B0576}" type="slidenum">
               <a:rPr lang="id-ID" smtClean="0"/>
+              <a:t>‹#›</a:t>
             </a:fld>
             <a:endParaRPr lang="id-ID"/>
           </a:p>
@@ -506,7 +514,6 @@
               <a:rPr lang="en-US" smtClean="0"/>
               <a:t>Click to edit Master text styles</a:t>
             </a:r>
-            <a:endParaRPr lang="en-US" smtClean="0"/>
           </a:p>
         </p:txBody>
       </p:sp>
@@ -527,6 +534,7 @@
           <a:p>
             <a:fld id="{BBE3DD70-27A9-46A8-BFA0-C575602C9FDE}" type="datetimeFigureOut">
               <a:rPr lang="id-ID" smtClean="0"/>
+              <a:t>23/12/2016</a:t>
             </a:fld>
             <a:endParaRPr lang="id-ID"/>
           </a:p>
@@ -568,6 +576,7 @@
           <a:p>
             <a:fld id="{92548EFC-61A5-4AFF-A0C2-AFE4C01B0576}" type="slidenum">
               <a:rPr lang="id-ID" smtClean="0"/>
+              <a:t>‹#›</a:t>
             </a:fld>
             <a:endParaRPr lang="id-ID"/>
           </a:p>
@@ -692,7 +701,6 @@
               <a:rPr lang="en-US" smtClean="0"/>
               <a:t>Click to edit Master text styles</a:t>
             </a:r>
-            <a:endParaRPr lang="en-US" smtClean="0"/>
           </a:p>
         </p:txBody>
       </p:sp>
@@ -713,6 +721,7 @@
           <a:p>
             <a:fld id="{BBE3DD70-27A9-46A8-BFA0-C575602C9FDE}" type="datetimeFigureOut">
               <a:rPr lang="id-ID" smtClean="0"/>
+              <a:t>23/12/2016</a:t>
             </a:fld>
             <a:endParaRPr lang="id-ID"/>
           </a:p>
@@ -754,6 +763,7 @@
           <a:p>
             <a:fld id="{92548EFC-61A5-4AFF-A0C2-AFE4C01B0576}" type="slidenum">
               <a:rPr lang="id-ID" smtClean="0"/>
+              <a:t>‹#›</a:t>
             </a:fld>
             <a:endParaRPr lang="id-ID"/>
           </a:p>
@@ -880,7 +890,6 @@
               <a:rPr lang="en-US" smtClean="0"/>
               <a:t>Click to edit Master text styles</a:t>
             </a:r>
-            <a:endParaRPr lang="en-US" smtClean="0"/>
           </a:p>
         </p:txBody>
       </p:sp>
@@ -948,7 +957,6 @@
               <a:rPr lang="en-US" smtClean="0"/>
               <a:t>Click to edit Master text styles</a:t>
             </a:r>
-            <a:endParaRPr lang="en-US" smtClean="0"/>
           </a:p>
         </p:txBody>
       </p:sp>
@@ -969,6 +977,7 @@
           <a:p>
             <a:fld id="{BBE3DD70-27A9-46A8-BFA0-C575602C9FDE}" type="datetimeFigureOut">
               <a:rPr lang="id-ID" smtClean="0"/>
+              <a:t>23/12/2016</a:t>
             </a:fld>
             <a:endParaRPr lang="id-ID"/>
           </a:p>
@@ -1010,6 +1019,7 @@
           <a:p>
             <a:fld id="{92548EFC-61A5-4AFF-A0C2-AFE4C01B0576}" type="slidenum">
               <a:rPr lang="id-ID" smtClean="0"/>
+              <a:t>‹#›</a:t>
             </a:fld>
             <a:endParaRPr lang="id-ID"/>
           </a:p>
@@ -1128,12 +1138,6 @@
               </a:rPr>
               <a:t>“</a:t>
             </a:r>
-            <a:endParaRPr lang="en-US" sz="8000" dirty="0">
-              <a:solidFill>
-                <a:schemeClr val="tx1"/>
-              </a:solidFill>
-              <a:effectLst/>
-            </a:endParaRPr>
           </a:p>
         </p:txBody>
       </p:sp>
@@ -1250,12 +1254,6 @@
               </a:rPr>
               <a:t>”</a:t>
             </a:r>
-            <a:endParaRPr lang="en-US" sz="8000" dirty="0">
-              <a:solidFill>
-                <a:schemeClr val="tx1"/>
-              </a:solidFill>
-              <a:effectLst/>
-            </a:endParaRPr>
           </a:p>
         </p:txBody>
       </p:sp>
@@ -1378,7 +1376,6 @@
               <a:rPr lang="en-US" smtClean="0"/>
               <a:t>Click to edit Master text styles</a:t>
             </a:r>
-            <a:endParaRPr lang="en-US" smtClean="0"/>
           </a:p>
         </p:txBody>
       </p:sp>
@@ -1399,6 +1396,7 @@
           <a:p>
             <a:fld id="{BBE3DD70-27A9-46A8-BFA0-C575602C9FDE}" type="datetimeFigureOut">
               <a:rPr lang="id-ID" smtClean="0"/>
+              <a:t>23/12/2016</a:t>
             </a:fld>
             <a:endParaRPr lang="id-ID"/>
           </a:p>
@@ -1440,6 +1438,7 @@
           <a:p>
             <a:fld id="{92548EFC-61A5-4AFF-A0C2-AFE4C01B0576}" type="slidenum">
               <a:rPr lang="id-ID" smtClean="0"/>
+              <a:t>‹#›</a:t>
             </a:fld>
             <a:endParaRPr lang="id-ID"/>
           </a:p>
@@ -1569,7 +1568,6 @@
               <a:rPr lang="en-US" smtClean="0"/>
               <a:t>Click to edit Master text styles</a:t>
             </a:r>
-            <a:endParaRPr lang="en-US" smtClean="0"/>
           </a:p>
         </p:txBody>
       </p:sp>
@@ -1637,7 +1635,6 @@
               <a:rPr lang="en-US" smtClean="0"/>
               <a:t>Click to edit Master text styles</a:t>
             </a:r>
-            <a:endParaRPr lang="en-US" smtClean="0"/>
           </a:p>
         </p:txBody>
       </p:sp>
@@ -1712,7 +1709,6 @@
               <a:rPr lang="en-US" smtClean="0"/>
               <a:t>Click to edit Master text styles</a:t>
             </a:r>
-            <a:endParaRPr lang="en-US" smtClean="0"/>
           </a:p>
         </p:txBody>
       </p:sp>
@@ -1780,7 +1776,6 @@
               <a:rPr lang="en-US" smtClean="0"/>
               <a:t>Click to edit Master text styles</a:t>
             </a:r>
-            <a:endParaRPr lang="en-US" smtClean="0"/>
           </a:p>
         </p:txBody>
       </p:sp>
@@ -1855,7 +1850,6 @@
               <a:rPr lang="en-US" smtClean="0"/>
               <a:t>Click to edit Master text styles</a:t>
             </a:r>
-            <a:endParaRPr lang="en-US" smtClean="0"/>
           </a:p>
         </p:txBody>
       </p:sp>
@@ -1923,7 +1917,6 @@
               <a:rPr lang="en-US" smtClean="0"/>
               <a:t>Click to edit Master text styles</a:t>
             </a:r>
-            <a:endParaRPr lang="en-US" smtClean="0"/>
           </a:p>
         </p:txBody>
       </p:sp>
@@ -1944,6 +1937,7 @@
           <a:p>
             <a:fld id="{BBE3DD70-27A9-46A8-BFA0-C575602C9FDE}" type="datetimeFigureOut">
               <a:rPr lang="id-ID" smtClean="0"/>
+              <a:t>23/12/2016</a:t>
             </a:fld>
             <a:endParaRPr lang="id-ID"/>
           </a:p>
@@ -1985,6 +1979,7 @@
           <a:p>
             <a:fld id="{92548EFC-61A5-4AFF-A0C2-AFE4C01B0576}" type="slidenum">
               <a:rPr lang="id-ID" smtClean="0"/>
+              <a:t>‹#›</a:t>
             </a:fld>
             <a:endParaRPr lang="id-ID"/>
           </a:p>
@@ -2114,7 +2109,6 @@
               <a:rPr lang="en-US" smtClean="0"/>
               <a:t>Click to edit Master text styles</a:t>
             </a:r>
-            <a:endParaRPr lang="en-US" smtClean="0"/>
           </a:p>
         </p:txBody>
       </p:sp>
@@ -2280,7 +2274,6 @@
               <a:rPr lang="en-US" smtClean="0"/>
               <a:t>Click to edit Master text styles</a:t>
             </a:r>
-            <a:endParaRPr lang="en-US" smtClean="0"/>
           </a:p>
         </p:txBody>
       </p:sp>
@@ -2355,7 +2348,6 @@
               <a:rPr lang="en-US" smtClean="0"/>
               <a:t>Click to edit Master text styles</a:t>
             </a:r>
-            <a:endParaRPr lang="en-US" smtClean="0"/>
           </a:p>
         </p:txBody>
       </p:sp>
@@ -2521,7 +2513,6 @@
               <a:rPr lang="en-US" smtClean="0"/>
               <a:t>Click to edit Master text styles</a:t>
             </a:r>
-            <a:endParaRPr lang="en-US" smtClean="0"/>
           </a:p>
         </p:txBody>
       </p:sp>
@@ -2596,7 +2587,6 @@
               <a:rPr lang="en-US" smtClean="0"/>
               <a:t>Click to edit Master text styles</a:t>
             </a:r>
-            <a:endParaRPr lang="en-US" smtClean="0"/>
           </a:p>
         </p:txBody>
       </p:sp>
@@ -2762,7 +2752,6 @@
               <a:rPr lang="en-US" smtClean="0"/>
               <a:t>Click to edit Master text styles</a:t>
             </a:r>
-            <a:endParaRPr lang="en-US" smtClean="0"/>
           </a:p>
         </p:txBody>
       </p:sp>
@@ -2783,6 +2772,7 @@
           <a:p>
             <a:fld id="{BBE3DD70-27A9-46A8-BFA0-C575602C9FDE}" type="datetimeFigureOut">
               <a:rPr lang="id-ID" smtClean="0"/>
+              <a:t>23/12/2016</a:t>
             </a:fld>
             <a:endParaRPr lang="id-ID"/>
           </a:p>
@@ -2824,6 +2814,7 @@
           <a:p>
             <a:fld id="{92548EFC-61A5-4AFF-A0C2-AFE4C01B0576}" type="slidenum">
               <a:rPr lang="id-ID" smtClean="0"/>
+              <a:t>‹#›</a:t>
             </a:fld>
             <a:endParaRPr lang="id-ID"/>
           </a:p>
@@ -2897,7 +2888,6 @@
               <a:rPr lang="en-US" smtClean="0"/>
               <a:t>Click to edit Master text styles</a:t>
             </a:r>
-            <a:endParaRPr lang="en-US" smtClean="0"/>
           </a:p>
           <a:p>
             <a:pPr lvl="1"/>
@@ -2905,7 +2895,6 @@
               <a:rPr lang="en-US" smtClean="0"/>
               <a:t>Second level</a:t>
             </a:r>
-            <a:endParaRPr lang="en-US" smtClean="0"/>
           </a:p>
           <a:p>
             <a:pPr lvl="2"/>
@@ -2913,7 +2902,6 @@
               <a:rPr lang="en-US" smtClean="0"/>
               <a:t>Third level</a:t>
             </a:r>
-            <a:endParaRPr lang="en-US" smtClean="0"/>
           </a:p>
           <a:p>
             <a:pPr lvl="3"/>
@@ -2921,7 +2909,6 @@
               <a:rPr lang="en-US" smtClean="0"/>
               <a:t>Fourth level</a:t>
             </a:r>
-            <a:endParaRPr lang="en-US" smtClean="0"/>
           </a:p>
           <a:p>
             <a:pPr lvl="4"/>
@@ -2950,6 +2937,7 @@
           <a:p>
             <a:fld id="{BBE3DD70-27A9-46A8-BFA0-C575602C9FDE}" type="datetimeFigureOut">
               <a:rPr lang="id-ID" smtClean="0"/>
+              <a:t>23/12/2016</a:t>
             </a:fld>
             <a:endParaRPr lang="id-ID"/>
           </a:p>
@@ -2991,6 +2979,7 @@
           <a:p>
             <a:fld id="{92548EFC-61A5-4AFF-A0C2-AFE4C01B0576}" type="slidenum">
               <a:rPr lang="id-ID" smtClean="0"/>
+              <a:t>‹#›</a:t>
             </a:fld>
             <a:endParaRPr lang="id-ID"/>
           </a:p>
@@ -3078,7 +3067,6 @@
               <a:rPr lang="en-US" smtClean="0"/>
               <a:t>Click to edit Master text styles</a:t>
             </a:r>
-            <a:endParaRPr lang="en-US" smtClean="0"/>
           </a:p>
           <a:p>
             <a:pPr lvl="1"/>
@@ -3086,7 +3074,6 @@
               <a:rPr lang="en-US" smtClean="0"/>
               <a:t>Second level</a:t>
             </a:r>
-            <a:endParaRPr lang="en-US" smtClean="0"/>
           </a:p>
           <a:p>
             <a:pPr lvl="2"/>
@@ -3094,7 +3081,6 @@
               <a:rPr lang="en-US" smtClean="0"/>
               <a:t>Third level</a:t>
             </a:r>
-            <a:endParaRPr lang="en-US" smtClean="0"/>
           </a:p>
           <a:p>
             <a:pPr lvl="3"/>
@@ -3102,7 +3088,6 @@
               <a:rPr lang="en-US" smtClean="0"/>
               <a:t>Fourth level</a:t>
             </a:r>
-            <a:endParaRPr lang="en-US" smtClean="0"/>
           </a:p>
           <a:p>
             <a:pPr lvl="4"/>
@@ -3131,6 +3116,7 @@
           <a:p>
             <a:fld id="{BBE3DD70-27A9-46A8-BFA0-C575602C9FDE}" type="datetimeFigureOut">
               <a:rPr lang="id-ID" smtClean="0"/>
+              <a:t>23/12/2016</a:t>
             </a:fld>
             <a:endParaRPr lang="id-ID"/>
           </a:p>
@@ -3172,6 +3158,7 @@
           <a:p>
             <a:fld id="{92548EFC-61A5-4AFF-A0C2-AFE4C01B0576}" type="slidenum">
               <a:rPr lang="id-ID" smtClean="0"/>
+              <a:t>‹#›</a:t>
             </a:fld>
             <a:endParaRPr lang="id-ID"/>
           </a:p>
@@ -3245,7 +3232,6 @@
               <a:rPr lang="en-US" smtClean="0"/>
               <a:t>Click to edit Master text styles</a:t>
             </a:r>
-            <a:endParaRPr lang="en-US" smtClean="0"/>
           </a:p>
           <a:p>
             <a:pPr lvl="1"/>
@@ -3253,7 +3239,6 @@
               <a:rPr lang="en-US" smtClean="0"/>
               <a:t>Second level</a:t>
             </a:r>
-            <a:endParaRPr lang="en-US" smtClean="0"/>
           </a:p>
           <a:p>
             <a:pPr lvl="2"/>
@@ -3261,7 +3246,6 @@
               <a:rPr lang="en-US" smtClean="0"/>
               <a:t>Third level</a:t>
             </a:r>
-            <a:endParaRPr lang="en-US" smtClean="0"/>
           </a:p>
           <a:p>
             <a:pPr lvl="3"/>
@@ -3269,7 +3253,6 @@
               <a:rPr lang="en-US" smtClean="0"/>
               <a:t>Fourth level</a:t>
             </a:r>
-            <a:endParaRPr lang="en-US" smtClean="0"/>
           </a:p>
           <a:p>
             <a:pPr lvl="4"/>
@@ -3298,6 +3281,7 @@
           <a:p>
             <a:fld id="{BBE3DD70-27A9-46A8-BFA0-C575602C9FDE}" type="datetimeFigureOut">
               <a:rPr lang="id-ID" smtClean="0"/>
+              <a:t>23/12/2016</a:t>
             </a:fld>
             <a:endParaRPr lang="id-ID"/>
           </a:p>
@@ -3339,6 +3323,7 @@
           <a:p>
             <a:fld id="{92548EFC-61A5-4AFF-A0C2-AFE4C01B0576}" type="slidenum">
               <a:rPr lang="id-ID" smtClean="0"/>
+              <a:t>‹#›</a:t>
             </a:fld>
             <a:endParaRPr lang="id-ID"/>
           </a:p>
@@ -3519,7 +3504,6 @@
               <a:rPr lang="en-US" smtClean="0"/>
               <a:t>Click to edit Master text styles</a:t>
             </a:r>
-            <a:endParaRPr lang="en-US" smtClean="0"/>
           </a:p>
         </p:txBody>
       </p:sp>
@@ -3540,6 +3524,7 @@
           <a:p>
             <a:fld id="{BBE3DD70-27A9-46A8-BFA0-C575602C9FDE}" type="datetimeFigureOut">
               <a:rPr lang="id-ID" smtClean="0"/>
+              <a:t>23/12/2016</a:t>
             </a:fld>
             <a:endParaRPr lang="id-ID"/>
           </a:p>
@@ -3581,6 +3566,7 @@
           <a:p>
             <a:fld id="{92548EFC-61A5-4AFF-A0C2-AFE4C01B0576}" type="slidenum">
               <a:rPr lang="id-ID" smtClean="0"/>
+              <a:t>‹#›</a:t>
             </a:fld>
             <a:endParaRPr lang="id-ID"/>
           </a:p>
@@ -3664,7 +3650,6 @@
               <a:rPr lang="en-US" smtClean="0"/>
               <a:t>Click to edit Master text styles</a:t>
             </a:r>
-            <a:endParaRPr lang="en-US" smtClean="0"/>
           </a:p>
           <a:p>
             <a:pPr lvl="1"/>
@@ -3672,7 +3657,6 @@
               <a:rPr lang="en-US" smtClean="0"/>
               <a:t>Second level</a:t>
             </a:r>
-            <a:endParaRPr lang="en-US" smtClean="0"/>
           </a:p>
           <a:p>
             <a:pPr lvl="2"/>
@@ -3680,7 +3664,6 @@
               <a:rPr lang="en-US" smtClean="0"/>
               <a:t>Third level</a:t>
             </a:r>
-            <a:endParaRPr lang="en-US" smtClean="0"/>
           </a:p>
           <a:p>
             <a:pPr lvl="3"/>
@@ -3688,7 +3671,6 @@
               <a:rPr lang="en-US" smtClean="0"/>
               <a:t>Fourth level</a:t>
             </a:r>
-            <a:endParaRPr lang="en-US" smtClean="0"/>
           </a:p>
           <a:p>
             <a:pPr lvl="4"/>
@@ -3725,7 +3707,6 @@
               <a:rPr lang="en-US" smtClean="0"/>
               <a:t>Click to edit Master text styles</a:t>
             </a:r>
-            <a:endParaRPr lang="en-US" smtClean="0"/>
           </a:p>
           <a:p>
             <a:pPr lvl="1"/>
@@ -3733,7 +3714,6 @@
               <a:rPr lang="en-US" smtClean="0"/>
               <a:t>Second level</a:t>
             </a:r>
-            <a:endParaRPr lang="en-US" smtClean="0"/>
           </a:p>
           <a:p>
             <a:pPr lvl="2"/>
@@ -3741,7 +3721,6 @@
               <a:rPr lang="en-US" smtClean="0"/>
               <a:t>Third level</a:t>
             </a:r>
-            <a:endParaRPr lang="en-US" smtClean="0"/>
           </a:p>
           <a:p>
             <a:pPr lvl="3"/>
@@ -3749,7 +3728,6 @@
               <a:rPr lang="en-US" smtClean="0"/>
               <a:t>Fourth level</a:t>
             </a:r>
-            <a:endParaRPr lang="en-US" smtClean="0"/>
           </a:p>
           <a:p>
             <a:pPr lvl="4"/>
@@ -3778,6 +3756,7 @@
           <a:p>
             <a:fld id="{BBE3DD70-27A9-46A8-BFA0-C575602C9FDE}" type="datetimeFigureOut">
               <a:rPr lang="id-ID" smtClean="0"/>
+              <a:t>23/12/2016</a:t>
             </a:fld>
             <a:endParaRPr lang="id-ID"/>
           </a:p>
@@ -3819,6 +3798,7 @@
           <a:p>
             <a:fld id="{92548EFC-61A5-4AFF-A0C2-AFE4C01B0576}" type="slidenum">
               <a:rPr lang="id-ID" smtClean="0"/>
+              <a:t>‹#›</a:t>
             </a:fld>
             <a:endParaRPr lang="id-ID"/>
           </a:p>
@@ -3942,7 +3922,6 @@
               <a:rPr lang="en-US" smtClean="0"/>
               <a:t>Click to edit Master text styles</a:t>
             </a:r>
-            <a:endParaRPr lang="en-US" smtClean="0"/>
           </a:p>
         </p:txBody>
       </p:sp>
@@ -3971,7 +3950,6 @@
               <a:rPr lang="en-US" smtClean="0"/>
               <a:t>Click to edit Master text styles</a:t>
             </a:r>
-            <a:endParaRPr lang="en-US" smtClean="0"/>
           </a:p>
           <a:p>
             <a:pPr lvl="1"/>
@@ -3979,7 +3957,6 @@
               <a:rPr lang="en-US" smtClean="0"/>
               <a:t>Second level</a:t>
             </a:r>
-            <a:endParaRPr lang="en-US" smtClean="0"/>
           </a:p>
           <a:p>
             <a:pPr lvl="2"/>
@@ -3987,7 +3964,6 @@
               <a:rPr lang="en-US" smtClean="0"/>
               <a:t>Third level</a:t>
             </a:r>
-            <a:endParaRPr lang="en-US" smtClean="0"/>
           </a:p>
           <a:p>
             <a:pPr lvl="3"/>
@@ -3995,7 +3971,6 @@
               <a:rPr lang="en-US" smtClean="0"/>
               <a:t>Fourth level</a:t>
             </a:r>
-            <a:endParaRPr lang="en-US" smtClean="0"/>
           </a:p>
           <a:p>
             <a:pPr lvl="4"/>
@@ -4072,7 +4047,6 @@
               <a:rPr lang="en-US" smtClean="0"/>
               <a:t>Click to edit Master text styles</a:t>
             </a:r>
-            <a:endParaRPr lang="en-US" smtClean="0"/>
           </a:p>
         </p:txBody>
       </p:sp>
@@ -4101,7 +4075,6 @@
               <a:rPr lang="en-US" smtClean="0"/>
               <a:t>Click to edit Master text styles</a:t>
             </a:r>
-            <a:endParaRPr lang="en-US" smtClean="0"/>
           </a:p>
           <a:p>
             <a:pPr lvl="1"/>
@@ -4109,7 +4082,6 @@
               <a:rPr lang="en-US" smtClean="0"/>
               <a:t>Second level</a:t>
             </a:r>
-            <a:endParaRPr lang="en-US" smtClean="0"/>
           </a:p>
           <a:p>
             <a:pPr lvl="2"/>
@@ -4117,7 +4089,6 @@
               <a:rPr lang="en-US" smtClean="0"/>
               <a:t>Third level</a:t>
             </a:r>
-            <a:endParaRPr lang="en-US" smtClean="0"/>
           </a:p>
           <a:p>
             <a:pPr lvl="3"/>
@@ -4125,7 +4096,6 @@
               <a:rPr lang="en-US" smtClean="0"/>
               <a:t>Fourth level</a:t>
             </a:r>
-            <a:endParaRPr lang="en-US" smtClean="0"/>
           </a:p>
           <a:p>
             <a:pPr lvl="4"/>
@@ -4154,6 +4124,7 @@
           <a:p>
             <a:fld id="{BBE3DD70-27A9-46A8-BFA0-C575602C9FDE}" type="datetimeFigureOut">
               <a:rPr lang="id-ID" smtClean="0"/>
+              <a:t>23/12/2016</a:t>
             </a:fld>
             <a:endParaRPr lang="id-ID"/>
           </a:p>
@@ -4195,6 +4166,7 @@
           <a:p>
             <a:fld id="{92548EFC-61A5-4AFF-A0C2-AFE4C01B0576}" type="slidenum">
               <a:rPr lang="id-ID" smtClean="0"/>
+              <a:t>‹#›</a:t>
             </a:fld>
             <a:endParaRPr lang="id-ID"/>
           </a:p>
@@ -4265,6 +4237,7 @@
           <a:p>
             <a:fld id="{BBE3DD70-27A9-46A8-BFA0-C575602C9FDE}" type="datetimeFigureOut">
               <a:rPr lang="id-ID" smtClean="0"/>
+              <a:t>23/12/2016</a:t>
             </a:fld>
             <a:endParaRPr lang="id-ID"/>
           </a:p>
@@ -4306,6 +4279,7 @@
           <a:p>
             <a:fld id="{92548EFC-61A5-4AFF-A0C2-AFE4C01B0576}" type="slidenum">
               <a:rPr lang="id-ID" smtClean="0"/>
+              <a:t>‹#›</a:t>
             </a:fld>
             <a:endParaRPr lang="id-ID"/>
           </a:p>
@@ -4353,6 +4327,7 @@
           <a:p>
             <a:fld id="{BBE3DD70-27A9-46A8-BFA0-C575602C9FDE}" type="datetimeFigureOut">
               <a:rPr lang="id-ID" smtClean="0"/>
+              <a:t>23/12/2016</a:t>
             </a:fld>
             <a:endParaRPr lang="id-ID"/>
           </a:p>
@@ -4394,6 +4369,7 @@
           <a:p>
             <a:fld id="{92548EFC-61A5-4AFF-A0C2-AFE4C01B0576}" type="slidenum">
               <a:rPr lang="id-ID" smtClean="0"/>
+              <a:t>‹#›</a:t>
             </a:fld>
             <a:endParaRPr lang="id-ID"/>
           </a:p>
@@ -4483,7 +4459,6 @@
               <a:rPr lang="en-US" smtClean="0"/>
               <a:t>Click to edit Master text styles</a:t>
             </a:r>
-            <a:endParaRPr lang="en-US" smtClean="0"/>
           </a:p>
           <a:p>
             <a:pPr lvl="1"/>
@@ -4491,7 +4466,6 @@
               <a:rPr lang="en-US" smtClean="0"/>
               <a:t>Second level</a:t>
             </a:r>
-            <a:endParaRPr lang="en-US" smtClean="0"/>
           </a:p>
           <a:p>
             <a:pPr lvl="2"/>
@@ -4499,7 +4473,6 @@
               <a:rPr lang="en-US" smtClean="0"/>
               <a:t>Third level</a:t>
             </a:r>
-            <a:endParaRPr lang="en-US" smtClean="0"/>
           </a:p>
           <a:p>
             <a:pPr lvl="3"/>
@@ -4507,7 +4480,6 @@
               <a:rPr lang="en-US" smtClean="0"/>
               <a:t>Fourth level</a:t>
             </a:r>
-            <a:endParaRPr lang="en-US" smtClean="0"/>
           </a:p>
           <a:p>
             <a:pPr lvl="4"/>
@@ -4581,7 +4553,6 @@
               <a:rPr lang="en-US" smtClean="0"/>
               <a:t>Click to edit Master text styles</a:t>
             </a:r>
-            <a:endParaRPr lang="en-US" smtClean="0"/>
           </a:p>
         </p:txBody>
       </p:sp>
@@ -4602,6 +4573,7 @@
           <a:p>
             <a:fld id="{BBE3DD70-27A9-46A8-BFA0-C575602C9FDE}" type="datetimeFigureOut">
               <a:rPr lang="id-ID" smtClean="0"/>
+              <a:t>23/12/2016</a:t>
             </a:fld>
             <a:endParaRPr lang="id-ID"/>
           </a:p>
@@ -4643,6 +4615,7 @@
           <a:p>
             <a:fld id="{92548EFC-61A5-4AFF-A0C2-AFE4C01B0576}" type="slidenum">
               <a:rPr lang="id-ID" smtClean="0"/>
+              <a:t>‹#›</a:t>
             </a:fld>
             <a:endParaRPr lang="id-ID"/>
           </a:p>
@@ -4862,7 +4835,6 @@
               <a:rPr lang="en-US" smtClean="0"/>
               <a:t>Click to edit Master text styles</a:t>
             </a:r>
-            <a:endParaRPr lang="en-US" smtClean="0"/>
           </a:p>
         </p:txBody>
       </p:sp>
@@ -4883,6 +4855,7 @@
           <a:p>
             <a:fld id="{BBE3DD70-27A9-46A8-BFA0-C575602C9FDE}" type="datetimeFigureOut">
               <a:rPr lang="id-ID" smtClean="0"/>
+              <a:t>23/12/2016</a:t>
             </a:fld>
             <a:endParaRPr lang="id-ID"/>
           </a:p>
@@ -4924,6 +4897,7 @@
           <a:p>
             <a:fld id="{92548EFC-61A5-4AFF-A0C2-AFE4C01B0576}" type="slidenum">
               <a:rPr lang="id-ID" smtClean="0"/>
+              <a:t>‹#›</a:t>
             </a:fld>
             <a:endParaRPr lang="id-ID"/>
           </a:p>
@@ -5022,7 +4996,6 @@
               <a:rPr lang="en-US" smtClean="0"/>
               <a:t>Click to edit Master text styles</a:t>
             </a:r>
-            <a:endParaRPr lang="en-US" smtClean="0"/>
           </a:p>
           <a:p>
             <a:pPr lvl="1"/>
@@ -5030,7 +5003,6 @@
               <a:rPr lang="en-US" smtClean="0"/>
               <a:t>Second level</a:t>
             </a:r>
-            <a:endParaRPr lang="en-US" smtClean="0"/>
           </a:p>
           <a:p>
             <a:pPr lvl="2"/>
@@ -5038,7 +5010,6 @@
               <a:rPr lang="en-US" smtClean="0"/>
               <a:t>Third level</a:t>
             </a:r>
-            <a:endParaRPr lang="en-US" smtClean="0"/>
           </a:p>
           <a:p>
             <a:pPr lvl="3"/>
@@ -5046,7 +5017,6 @@
               <a:rPr lang="en-US" smtClean="0"/>
               <a:t>Fourth level</a:t>
             </a:r>
-            <a:endParaRPr lang="en-US" smtClean="0"/>
           </a:p>
           <a:p>
             <a:pPr lvl="4"/>
@@ -5093,6 +5063,7 @@
           <a:p>
             <a:fld id="{BBE3DD70-27A9-46A8-BFA0-C575602C9FDE}" type="datetimeFigureOut">
               <a:rPr lang="id-ID" smtClean="0"/>
+              <a:t>23/12/2016</a:t>
             </a:fld>
             <a:endParaRPr lang="id-ID"/>
           </a:p>
@@ -5170,6 +5141,7 @@
           <a:p>
             <a:fld id="{92548EFC-61A5-4AFF-A0C2-AFE4C01B0576}" type="slidenum">
               <a:rPr lang="id-ID" smtClean="0"/>
+              <a:t>‹#›</a:t>
             </a:fld>
             <a:endParaRPr lang="id-ID"/>
           </a:p>
@@ -5597,7 +5569,6 @@
               <a:rPr lang="en-US" altLang="id-ID" dirty="0" smtClean="0"/>
               <a:t>UNTUK WEB SERVER</a:t>
             </a:r>
-            <a:endParaRPr lang="en-US" altLang="id-ID" dirty="0" smtClean="0"/>
           </a:p>
         </p:txBody>
       </p:sp>
@@ -5627,35 +5598,30 @@
               <a:rPr lang="id-ID" sz="1800" dirty="0" smtClean="0"/>
               <a:t>KELOMPOK 4</a:t>
             </a:r>
-            <a:endParaRPr lang="id-ID" sz="1800" dirty="0" smtClean="0"/>
           </a:p>
           <a:p>
             <a:r>
               <a:rPr lang="id-ID" sz="1800" dirty="0" smtClean="0"/>
               <a:t>FARHAN RAMADHANA (5114100078)</a:t>
             </a:r>
-            <a:endParaRPr lang="id-ID" sz="1800" dirty="0" smtClean="0"/>
           </a:p>
           <a:p>
             <a:r>
               <a:rPr lang="id-ID" sz="1800" dirty="0" smtClean="0"/>
               <a:t>MUHAMMAD FAISHAL ILHAM (5114100076)</a:t>
             </a:r>
-            <a:endParaRPr lang="id-ID" sz="1800" dirty="0" smtClean="0"/>
           </a:p>
           <a:p>
             <a:r>
               <a:rPr lang="id-ID" sz="1800" dirty="0" smtClean="0"/>
               <a:t>KHARISMA MONIKA (5114100092)</a:t>
             </a:r>
-            <a:endParaRPr lang="id-ID" sz="1800" dirty="0" smtClean="0"/>
           </a:p>
           <a:p>
             <a:r>
               <a:rPr lang="id-ID" sz="1800" dirty="0" smtClean="0"/>
               <a:t>WILDAN LUTFI (5114100080)</a:t>
             </a:r>
-            <a:endParaRPr lang="id-ID" sz="1800" dirty="0" smtClean="0"/>
           </a:p>
           <a:p>
             <a:r>
@@ -5746,7 +5712,6 @@
               <a:rPr lang="id-ID" dirty="0" smtClean="0"/>
               <a:t>Load balancing merupakan suatu teknik untuk mendistribusikan beban kerja pada dua atau bahkan lebih suatu koneksi jaringan secara seimbang agar pekerjaan dapat berjalan optimal dan tidak overload (kelebihan) beban pada salah satu jalur koneksi.</a:t>
             </a:r>
-            <a:endParaRPr lang="id-ID" dirty="0" smtClean="0"/>
           </a:p>
           <a:p>
             <a:pPr marL="0" indent="0" algn="just">
@@ -5756,7 +5721,6 @@
               <a:rPr lang="en-US" altLang="id-ID" dirty="0"/>
               <a:t>Selain itu fungsi load balancing adalah untuk mengarahkan client pada server yang lain, disaat server yang satu sedang mengalami gangguan</a:t>
             </a:r>
-            <a:endParaRPr lang="en-US" altLang="id-ID" dirty="0"/>
           </a:p>
         </p:txBody>
       </p:sp>
@@ -5877,13 +5841,13 @@
         </p:style>
         <p:txBody>
           <a:bodyPr rtlCol="0" anchor="ctr"/>
+          <a:lstStyle/>
           <a:p>
             <a:pPr algn="ctr"/>
             <a:r>
               <a:rPr lang="en-US"/>
               <a:t>CLIENT</a:t>
             </a:r>
-            <a:endParaRPr lang="en-US"/>
           </a:p>
         </p:txBody>
       </p:sp>
@@ -5918,13 +5882,13 @@
         </p:style>
         <p:txBody>
           <a:bodyPr rtlCol="0" anchor="ctr"/>
+          <a:lstStyle/>
           <a:p>
             <a:pPr algn="ctr"/>
             <a:r>
               <a:rPr lang="en-US"/>
               <a:t>LOAD BALANCER</a:t>
             </a:r>
-            <a:endParaRPr lang="en-US"/>
           </a:p>
         </p:txBody>
       </p:sp>
@@ -5959,13 +5923,13 @@
         </p:style>
         <p:txBody>
           <a:bodyPr rtlCol="0" anchor="ctr"/>
+          <a:lstStyle/>
           <a:p>
             <a:pPr algn="ctr"/>
             <a:r>
               <a:rPr lang="en-US"/>
               <a:t>SERVER 2</a:t>
             </a:r>
-            <a:endParaRPr lang="en-US"/>
           </a:p>
         </p:txBody>
       </p:sp>
@@ -6000,13 +5964,13 @@
         </p:style>
         <p:txBody>
           <a:bodyPr rtlCol="0" anchor="ctr"/>
+          <a:lstStyle/>
           <a:p>
             <a:pPr algn="ctr"/>
             <a:r>
               <a:rPr lang="en-US"/>
               <a:t>SERVER 1</a:t>
             </a:r>
-            <a:endParaRPr lang="en-US"/>
           </a:p>
         </p:txBody>
       </p:sp>
@@ -6041,13 +6005,13 @@
         </p:style>
         <p:txBody>
           <a:bodyPr rtlCol="0" anchor="ctr"/>
+          <a:lstStyle/>
           <a:p>
             <a:pPr algn="ctr"/>
             <a:r>
               <a:rPr lang="en-US"/>
               <a:t>SERVER 3</a:t>
             </a:r>
-            <a:endParaRPr lang="en-US"/>
           </a:p>
         </p:txBody>
       </p:sp>
@@ -6289,7 +6253,6 @@
               <a:rPr lang="en-US" altLang="id-ID" dirty="0" smtClean="0"/>
               <a:t>algoritma ini membagi beban secara berurutan ke tiga server tersebut. </a:t>
             </a:r>
-            <a:endParaRPr lang="en-US" altLang="id-ID" dirty="0" smtClean="0"/>
           </a:p>
         </p:txBody>
       </p:sp>
@@ -6455,7 +6418,35 @@
             </a:pPr>
             <a:r>
               <a:rPr lang="id-ID" dirty="0" smtClean="0"/>
-              <a:t>Seperti yang dijelaskan sebelumnya, tipe data yang ditangani oleh load balancing kami berupa format file video. Tipe-tipe data tersebut diantaranya seperti 3gp,mp4,flv,mkv, dan beberapa tipe data file video lainnya.</a:t>
+              <a:t>Seperti yang dijelaskan sebelumnya, tipe data yang ditangani oleh load balancing kami berupa format file video. Tipe-tipe data tersebut </a:t>
+            </a:r>
+            <a:r>
+              <a:rPr lang="en-US" dirty="0" err="1" smtClean="0"/>
+              <a:t>yaitu</a:t>
+            </a:r>
+            <a:r>
+              <a:rPr lang="en-US" dirty="0" smtClean="0"/>
+              <a:t> </a:t>
+            </a:r>
+            <a:r>
+              <a:rPr lang="id-ID" dirty="0" smtClean="0"/>
+              <a:t>3gp,mp4,</a:t>
+            </a:r>
+            <a:r>
+              <a:rPr lang="en-US" dirty="0" err="1" smtClean="0"/>
+              <a:t>dan</a:t>
+            </a:r>
+            <a:r>
+              <a:rPr lang="en-US" dirty="0" smtClean="0"/>
+              <a:t> </a:t>
+            </a:r>
+            <a:r>
+              <a:rPr lang="id-ID" dirty="0" smtClean="0"/>
+              <a:t>flv</a:t>
+            </a:r>
+            <a:r>
+              <a:rPr lang="en-US" dirty="0" smtClean="0"/>
+              <a:t>.</a:t>
             </a:r>
             <a:endParaRPr lang="id-ID" dirty="0"/>
           </a:p>
@@ -6496,6 +6487,350 @@
             <p:ph type="title"/>
           </p:nvPr>
         </p:nvSpPr>
+        <p:spPr/>
+        <p:txBody>
+          <a:bodyPr/>
+          <a:lstStyle/>
+          <a:p>
+            <a:r>
+              <a:rPr lang="en-US" dirty="0" smtClean="0"/>
+              <a:t>Tata </a:t>
+            </a:r>
+            <a:r>
+              <a:rPr lang="en-US" dirty="0" err="1" smtClean="0"/>
+              <a:t>cara</a:t>
+            </a:r>
+            <a:r>
+              <a:rPr lang="en-US" dirty="0" smtClean="0"/>
+              <a:t> </a:t>
+            </a:r>
+            <a:r>
+              <a:rPr lang="en-US" dirty="0" err="1" smtClean="0"/>
+              <a:t>Akses</a:t>
+            </a:r>
+            <a:r>
+              <a:rPr lang="en-US" dirty="0" smtClean="0"/>
+              <a:t> Video </a:t>
+            </a:r>
+            <a:endParaRPr lang="en-US" dirty="0"/>
+          </a:p>
+        </p:txBody>
+      </p:sp>
+      <p:sp>
+        <p:nvSpPr>
+          <p:cNvPr id="3" name="Content Placeholder 2"/>
+          <p:cNvSpPr>
+            <a:spLocks noGrp="1"/>
+          </p:cNvSpPr>
+          <p:nvPr>
+            <p:ph idx="1"/>
+          </p:nvPr>
+        </p:nvSpPr>
+        <p:spPr/>
+        <p:txBody>
+          <a:bodyPr>
+            <a:normAutofit/>
+          </a:bodyPr>
+          <a:lstStyle/>
+          <a:p>
+            <a:pPr marL="0" indent="0">
+              <a:buNone/>
+            </a:pPr>
+            <a:r>
+              <a:rPr lang="en-US" dirty="0" smtClean="0"/>
+              <a:t>Default </a:t>
+            </a:r>
+            <a:r>
+              <a:rPr lang="en-US" dirty="0" err="1"/>
+              <a:t>nomor</a:t>
+            </a:r>
+            <a:r>
+              <a:rPr lang="en-US" dirty="0"/>
+              <a:t> port </a:t>
+            </a:r>
+            <a:r>
+              <a:rPr lang="en-US" dirty="0" err="1"/>
+              <a:t>untuk</a:t>
+            </a:r>
+            <a:r>
+              <a:rPr lang="en-US" dirty="0"/>
+              <a:t> di </a:t>
+            </a:r>
+            <a:r>
+              <a:rPr lang="en-US" dirty="0" err="1"/>
+              <a:t>akses</a:t>
+            </a:r>
+            <a:r>
+              <a:rPr lang="en-US" dirty="0"/>
+              <a:t> = 8010</a:t>
+            </a:r>
+          </a:p>
+          <a:p>
+            <a:pPr marL="0" indent="0">
+              <a:buNone/>
+            </a:pPr>
+            <a:r>
+              <a:rPr lang="en-US" smtClean="0"/>
+              <a:t>1. Ketik</a:t>
+            </a:r>
+            <a:r>
+              <a:rPr lang="en-US" dirty="0" smtClean="0"/>
+              <a:t> </a:t>
+            </a:r>
+            <a:r>
+              <a:rPr lang="en-US" dirty="0"/>
+              <a:t>"localhost:[</a:t>
+            </a:r>
+            <a:r>
+              <a:rPr lang="en-US" dirty="0" err="1"/>
+              <a:t>nomorport</a:t>
+            </a:r>
+            <a:r>
+              <a:rPr lang="en-US" dirty="0"/>
+              <a:t>]/front" </a:t>
+            </a:r>
+            <a:r>
+              <a:rPr lang="en-US" dirty="0" err="1"/>
+              <a:t>untuk</a:t>
+            </a:r>
+            <a:r>
+              <a:rPr lang="en-US" dirty="0"/>
+              <a:t> </a:t>
+            </a:r>
+            <a:r>
+              <a:rPr lang="en-US" dirty="0" err="1"/>
+              <a:t>masuk</a:t>
+            </a:r>
+            <a:r>
+              <a:rPr lang="en-US" dirty="0"/>
+              <a:t> </a:t>
+            </a:r>
+            <a:r>
+              <a:rPr lang="en-US" dirty="0" err="1"/>
+              <a:t>ke</a:t>
+            </a:r>
+            <a:r>
+              <a:rPr lang="en-US" dirty="0"/>
+              <a:t> </a:t>
+            </a:r>
+            <a:r>
+              <a:rPr lang="en-US" dirty="0" err="1"/>
+              <a:t>halaman</a:t>
+            </a:r>
+            <a:r>
+              <a:rPr lang="en-US" dirty="0"/>
+              <a:t> </a:t>
+            </a:r>
+            <a:r>
+              <a:rPr lang="en-US" dirty="0" err="1" smtClean="0"/>
+              <a:t>depan</a:t>
+            </a:r>
+            <a:r>
+              <a:rPr lang="en-US" dirty="0"/>
+              <a:t>		</a:t>
+            </a:r>
+            <a:endParaRPr lang="en-US" dirty="0" smtClean="0"/>
+          </a:p>
+          <a:p>
+            <a:pPr marL="0" indent="0">
+              <a:buNone/>
+            </a:pPr>
+            <a:r>
+              <a:rPr lang="en-US" dirty="0" smtClean="0"/>
+              <a:t>2</a:t>
+            </a:r>
+            <a:r>
+              <a:rPr lang="en-US" dirty="0"/>
+              <a:t>. </a:t>
+            </a:r>
+            <a:r>
+              <a:rPr lang="en-US" dirty="0" err="1"/>
+              <a:t>Ketik</a:t>
+            </a:r>
+            <a:r>
+              <a:rPr lang="en-US" dirty="0"/>
+              <a:t> "localhost:[</a:t>
+            </a:r>
+            <a:r>
+              <a:rPr lang="en-US" dirty="0" err="1"/>
+              <a:t>nomorport</a:t>
+            </a:r>
+            <a:r>
+              <a:rPr lang="en-US" dirty="0"/>
+              <a:t>]/front/videomp4" </a:t>
+            </a:r>
+            <a:r>
+              <a:rPr lang="en-US" dirty="0" err="1"/>
+              <a:t>untuk</a:t>
+            </a:r>
+            <a:r>
+              <a:rPr lang="en-US" dirty="0"/>
+              <a:t> </a:t>
+            </a:r>
+            <a:r>
+              <a:rPr lang="en-US" dirty="0" err="1"/>
+              <a:t>memutar</a:t>
+            </a:r>
+            <a:r>
+              <a:rPr lang="en-US" dirty="0"/>
+              <a:t> video </a:t>
+            </a:r>
+            <a:r>
+              <a:rPr lang="en-US" dirty="0" smtClean="0"/>
+              <a:t>mp4</a:t>
+            </a:r>
+            <a:endParaRPr lang="en-US" dirty="0"/>
+          </a:p>
+          <a:p>
+            <a:pPr marL="0" indent="0">
+              <a:buNone/>
+            </a:pPr>
+            <a:r>
+              <a:rPr lang="en-US" dirty="0" smtClean="0"/>
+              <a:t>3</a:t>
+            </a:r>
+            <a:r>
+              <a:rPr lang="en-US" dirty="0"/>
+              <a:t>. </a:t>
+            </a:r>
+            <a:r>
+              <a:rPr lang="en-US" dirty="0" err="1"/>
+              <a:t>Ketik</a:t>
+            </a:r>
+            <a:r>
+              <a:rPr lang="en-US" dirty="0"/>
+              <a:t> "localhost:[</a:t>
+            </a:r>
+            <a:r>
+              <a:rPr lang="en-US" dirty="0" err="1"/>
+              <a:t>nomorport</a:t>
+            </a:r>
+            <a:r>
+              <a:rPr lang="en-US" dirty="0"/>
+              <a:t>]/front/video3gp" </a:t>
+            </a:r>
+            <a:r>
+              <a:rPr lang="en-US" dirty="0" err="1"/>
+              <a:t>untuk</a:t>
+            </a:r>
+            <a:r>
+              <a:rPr lang="en-US" dirty="0"/>
+              <a:t> </a:t>
+            </a:r>
+            <a:r>
+              <a:rPr lang="en-US" dirty="0" err="1"/>
+              <a:t>memutar</a:t>
+            </a:r>
+            <a:r>
+              <a:rPr lang="en-US" dirty="0"/>
+              <a:t> video </a:t>
+            </a:r>
+            <a:r>
+              <a:rPr lang="en-US" dirty="0" smtClean="0"/>
+              <a:t>3gp</a:t>
+            </a:r>
+            <a:endParaRPr lang="en-US" dirty="0"/>
+          </a:p>
+          <a:p>
+            <a:pPr marL="0" indent="0">
+              <a:buNone/>
+            </a:pPr>
+            <a:r>
+              <a:rPr lang="en-US" dirty="0" smtClean="0"/>
+              <a:t>4</a:t>
+            </a:r>
+            <a:r>
+              <a:rPr lang="en-US" dirty="0"/>
+              <a:t>. </a:t>
+            </a:r>
+            <a:r>
+              <a:rPr lang="en-US" dirty="0" err="1"/>
+              <a:t>Ketik</a:t>
+            </a:r>
+            <a:r>
+              <a:rPr lang="en-US" dirty="0"/>
+              <a:t> "localhost:[</a:t>
+            </a:r>
+            <a:r>
+              <a:rPr lang="en-US" dirty="0" err="1"/>
+              <a:t>nomorport</a:t>
+            </a:r>
+            <a:r>
+              <a:rPr lang="en-US" dirty="0"/>
+              <a:t>]/front/</a:t>
+            </a:r>
+            <a:r>
+              <a:rPr lang="en-US" dirty="0" err="1"/>
+              <a:t>videoflv</a:t>
+            </a:r>
+            <a:r>
+              <a:rPr lang="en-US" dirty="0"/>
+              <a:t>" </a:t>
+            </a:r>
+            <a:r>
+              <a:rPr lang="en-US" dirty="0" err="1"/>
+              <a:t>untuk</a:t>
+            </a:r>
+            <a:r>
+              <a:rPr lang="en-US" dirty="0"/>
+              <a:t> </a:t>
+            </a:r>
+            <a:r>
+              <a:rPr lang="en-US" dirty="0" err="1"/>
+              <a:t>memutar</a:t>
+            </a:r>
+            <a:r>
+              <a:rPr lang="en-US" dirty="0"/>
+              <a:t> video </a:t>
+            </a:r>
+            <a:r>
+              <a:rPr lang="en-US" dirty="0" err="1" smtClean="0"/>
+              <a:t>flv</a:t>
+            </a:r>
+            <a:endParaRPr lang="en-US" dirty="0"/>
+          </a:p>
+        </p:txBody>
+      </p:sp>
+    </p:spTree>
+    <p:extLst>
+      <p:ext uri="{BB962C8B-B14F-4D97-AF65-F5344CB8AC3E}">
+        <p14:creationId xmlns:p14="http://schemas.microsoft.com/office/powerpoint/2010/main" val="3739343160"/>
+      </p:ext>
+    </p:extLst>
+  </p:cSld>
+  <p:clrMapOvr>
+    <a:masterClrMapping/>
+  </p:clrMapOvr>
+</p:sld>
+</file>
+
+<file path=ppt/slides/slide8.xml><?xml version="1.0" encoding="utf-8"?>
+<p:sld xmlns:a="http://schemas.openxmlformats.org/drawingml/2006/main" xmlns:r="http://schemas.openxmlformats.org/officeDocument/2006/relationships" xmlns:p="http://schemas.openxmlformats.org/presentationml/2006/main">
+  <p:cSld>
+    <p:spTree>
+      <p:nvGrpSpPr>
+        <p:cNvPr id="1" name=""/>
+        <p:cNvGrpSpPr/>
+        <p:nvPr/>
+      </p:nvGrpSpPr>
+      <p:grpSpPr>
+        <a:xfrm>
+          <a:off x="0" y="0"/>
+          <a:ext cx="0" cy="0"/>
+          <a:chOff x="0" y="0"/>
+          <a:chExt cx="0" cy="0"/>
+        </a:xfrm>
+      </p:grpSpPr>
+      <p:sp>
+        <p:nvSpPr>
+          <p:cNvPr id="2" name="Title 1"/>
+          <p:cNvSpPr>
+            <a:spLocks noGrp="1"/>
+          </p:cNvSpPr>
+          <p:nvPr>
+            <p:ph type="title"/>
+          </p:nvPr>
+        </p:nvSpPr>
         <p:spPr>
           <a:xfrm>
             <a:off x="913795" y="1093692"/>
@@ -6541,7 +6876,6 @@
               <a:rPr lang="id-ID" dirty="0" smtClean="0"/>
               <a:t>Return code yang kami gunakan mengacu pada return code HTTP. Berikut beberapa return code yang kami gunakan yaitu :</a:t>
             </a:r>
-            <a:endParaRPr lang="id-ID" dirty="0" smtClean="0"/>
           </a:p>
           <a:p>
             <a:pPr marL="0" indent="0">
@@ -6551,7 +6885,6 @@
               <a:rPr lang="id-ID" dirty="0" smtClean="0"/>
               <a:t>200 = jika file video ada </a:t>
             </a:r>
-            <a:endParaRPr lang="id-ID" dirty="0" smtClean="0"/>
           </a:p>
           <a:p>
             <a:pPr marL="0" indent="0">
@@ -6561,7 +6894,6 @@
               <a:rPr lang="id-ID" dirty="0" smtClean="0"/>
               <a:t>404 = jika file tidak ditemukan</a:t>
             </a:r>
-            <a:endParaRPr lang="id-ID" dirty="0" smtClean="0"/>
           </a:p>
           <a:p>
             <a:pPr marL="0" indent="0">
@@ -6571,7 +6903,6 @@
               <a:rPr lang="id-ID" dirty="0" smtClean="0"/>
               <a:t>301 = file dipindah permanen</a:t>
             </a:r>
-            <a:endParaRPr lang="id-ID" dirty="0" smtClean="0"/>
           </a:p>
           <a:p>
             <a:pPr marL="0" indent="0">
@@ -6837,6 +7168,8 @@
       </a:bgFillStyleLst>
     </a:fmtScheme>
   </a:themeElements>
+  <a:objectDefaults/>
+  <a:extraClrSchemeLst/>
   <a:extLst>
     <a:ext uri="{05A4C25C-085E-4340-85A3-A5531E510DB2}">
       <thm15:themeFamily xmlns:thm15="http://schemas.microsoft.com/office/thememl/2012/main" name="Office Theme" id="{62F939B6-93AF-4DB8-9C6B-D6C7DFDC589F}" vid="{4A3C46E8-61CC-4603-A589-7422A47A8E4A}"/>

</xml_diff>